<commit_message>
integrated website of IoTASAP 2019
</commit_message>
<xml_diff>
--- a/images/IoT-ASAP_Logo.pptx
+++ b/images/IoT-ASAP_Logo.pptx
@@ -8,8 +8,9 @@
     <p:sldId id="257" r:id="rId2"/>
     <p:sldId id="260" r:id="rId3"/>
     <p:sldId id="261" r:id="rId4"/>
-    <p:sldId id="262" r:id="rId5"/>
-    <p:sldId id="258" r:id="rId6"/>
+    <p:sldId id="263" r:id="rId5"/>
+    <p:sldId id="262" r:id="rId6"/>
+    <p:sldId id="258" r:id="rId7"/>
   </p:sldIdLst>
   <p:sldSz cx="5400675" cy="3600450"/>
   <p:notesSz cx="6858000" cy="9144000"/>
@@ -258,7 +259,7 @@
           <a:p>
             <a:fld id="{F3B505E5-71AA-4F56-A163-12C04BFEC044}" type="datetimeFigureOut">
               <a:rPr lang="en-US" smtClean="0"/>
-              <a:t>12/11/2017</a:t>
+              <a:t>10/29/2018</a:t>
             </a:fld>
             <a:endParaRPr lang="en-US"/>
           </a:p>
@@ -300,7 +301,7 @@
           <a:p>
             <a:fld id="{F1182DC5-15AB-4F5F-8870-C4F577B151D1}" type="slidenum">
               <a:rPr lang="en-US" smtClean="0"/>
-              <a:t>‹Nr.›</a:t>
+              <a:t>‹#›</a:t>
             </a:fld>
             <a:endParaRPr lang="en-US"/>
           </a:p>
@@ -428,7 +429,7 @@
           <a:p>
             <a:fld id="{F3B505E5-71AA-4F56-A163-12C04BFEC044}" type="datetimeFigureOut">
               <a:rPr lang="en-US" smtClean="0"/>
-              <a:t>12/11/2017</a:t>
+              <a:t>10/29/2018</a:t>
             </a:fld>
             <a:endParaRPr lang="en-US"/>
           </a:p>
@@ -470,7 +471,7 @@
           <a:p>
             <a:fld id="{F1182DC5-15AB-4F5F-8870-C4F577B151D1}" type="slidenum">
               <a:rPr lang="en-US" smtClean="0"/>
-              <a:t>‹Nr.›</a:t>
+              <a:t>‹#›</a:t>
             </a:fld>
             <a:endParaRPr lang="en-US"/>
           </a:p>
@@ -608,7 +609,7 @@
           <a:p>
             <a:fld id="{F3B505E5-71AA-4F56-A163-12C04BFEC044}" type="datetimeFigureOut">
               <a:rPr lang="en-US" smtClean="0"/>
-              <a:t>12/11/2017</a:t>
+              <a:t>10/29/2018</a:t>
             </a:fld>
             <a:endParaRPr lang="en-US"/>
           </a:p>
@@ -650,7 +651,7 @@
           <a:p>
             <a:fld id="{F1182DC5-15AB-4F5F-8870-C4F577B151D1}" type="slidenum">
               <a:rPr lang="en-US" smtClean="0"/>
-              <a:t>‹Nr.›</a:t>
+              <a:t>‹#›</a:t>
             </a:fld>
             <a:endParaRPr lang="en-US"/>
           </a:p>
@@ -778,7 +779,7 @@
           <a:p>
             <a:fld id="{F3B505E5-71AA-4F56-A163-12C04BFEC044}" type="datetimeFigureOut">
               <a:rPr lang="en-US" smtClean="0"/>
-              <a:t>12/11/2017</a:t>
+              <a:t>10/29/2018</a:t>
             </a:fld>
             <a:endParaRPr lang="en-US"/>
           </a:p>
@@ -820,7 +821,7 @@
           <a:p>
             <a:fld id="{F1182DC5-15AB-4F5F-8870-C4F577B151D1}" type="slidenum">
               <a:rPr lang="en-US" smtClean="0"/>
-              <a:t>‹Nr.›</a:t>
+              <a:t>‹#›</a:t>
             </a:fld>
             <a:endParaRPr lang="en-US"/>
           </a:p>
@@ -1022,7 +1023,7 @@
           <a:p>
             <a:fld id="{F3B505E5-71AA-4F56-A163-12C04BFEC044}" type="datetimeFigureOut">
               <a:rPr lang="en-US" smtClean="0"/>
-              <a:t>12/11/2017</a:t>
+              <a:t>10/29/2018</a:t>
             </a:fld>
             <a:endParaRPr lang="en-US"/>
           </a:p>
@@ -1064,7 +1065,7 @@
           <a:p>
             <a:fld id="{F1182DC5-15AB-4F5F-8870-C4F577B151D1}" type="slidenum">
               <a:rPr lang="en-US" smtClean="0"/>
-              <a:t>‹Nr.›</a:t>
+              <a:t>‹#›</a:t>
             </a:fld>
             <a:endParaRPr lang="en-US"/>
           </a:p>
@@ -1254,7 +1255,7 @@
           <a:p>
             <a:fld id="{F3B505E5-71AA-4F56-A163-12C04BFEC044}" type="datetimeFigureOut">
               <a:rPr lang="en-US" smtClean="0"/>
-              <a:t>12/11/2017</a:t>
+              <a:t>10/29/2018</a:t>
             </a:fld>
             <a:endParaRPr lang="en-US"/>
           </a:p>
@@ -1296,7 +1297,7 @@
           <a:p>
             <a:fld id="{F1182DC5-15AB-4F5F-8870-C4F577B151D1}" type="slidenum">
               <a:rPr lang="en-US" smtClean="0"/>
-              <a:t>‹Nr.›</a:t>
+              <a:t>‹#›</a:t>
             </a:fld>
             <a:endParaRPr lang="en-US"/>
           </a:p>
@@ -1621,7 +1622,7 @@
           <a:p>
             <a:fld id="{F3B505E5-71AA-4F56-A163-12C04BFEC044}" type="datetimeFigureOut">
               <a:rPr lang="en-US" smtClean="0"/>
-              <a:t>12/11/2017</a:t>
+              <a:t>10/29/2018</a:t>
             </a:fld>
             <a:endParaRPr lang="en-US"/>
           </a:p>
@@ -1663,7 +1664,7 @@
           <a:p>
             <a:fld id="{F1182DC5-15AB-4F5F-8870-C4F577B151D1}" type="slidenum">
               <a:rPr lang="en-US" smtClean="0"/>
-              <a:t>‹Nr.›</a:t>
+              <a:t>‹#›</a:t>
             </a:fld>
             <a:endParaRPr lang="en-US"/>
           </a:p>
@@ -1739,7 +1740,7 @@
           <a:p>
             <a:fld id="{F3B505E5-71AA-4F56-A163-12C04BFEC044}" type="datetimeFigureOut">
               <a:rPr lang="en-US" smtClean="0"/>
-              <a:t>12/11/2017</a:t>
+              <a:t>10/29/2018</a:t>
             </a:fld>
             <a:endParaRPr lang="en-US"/>
           </a:p>
@@ -1781,7 +1782,7 @@
           <a:p>
             <a:fld id="{F1182DC5-15AB-4F5F-8870-C4F577B151D1}" type="slidenum">
               <a:rPr lang="en-US" smtClean="0"/>
-              <a:t>‹Nr.›</a:t>
+              <a:t>‹#›</a:t>
             </a:fld>
             <a:endParaRPr lang="en-US"/>
           </a:p>
@@ -1834,7 +1835,7 @@
           <a:p>
             <a:fld id="{F3B505E5-71AA-4F56-A163-12C04BFEC044}" type="datetimeFigureOut">
               <a:rPr lang="en-US" smtClean="0"/>
-              <a:t>12/11/2017</a:t>
+              <a:t>10/29/2018</a:t>
             </a:fld>
             <a:endParaRPr lang="en-US"/>
           </a:p>
@@ -1876,7 +1877,7 @@
           <a:p>
             <a:fld id="{F1182DC5-15AB-4F5F-8870-C4F577B151D1}" type="slidenum">
               <a:rPr lang="en-US" smtClean="0"/>
-              <a:t>‹Nr.›</a:t>
+              <a:t>‹#›</a:t>
             </a:fld>
             <a:endParaRPr lang="en-US"/>
           </a:p>
@@ -2111,7 +2112,7 @@
           <a:p>
             <a:fld id="{F3B505E5-71AA-4F56-A163-12C04BFEC044}" type="datetimeFigureOut">
               <a:rPr lang="en-US" smtClean="0"/>
-              <a:t>12/11/2017</a:t>
+              <a:t>10/29/2018</a:t>
             </a:fld>
             <a:endParaRPr lang="en-US"/>
           </a:p>
@@ -2153,7 +2154,7 @@
           <a:p>
             <a:fld id="{F1182DC5-15AB-4F5F-8870-C4F577B151D1}" type="slidenum">
               <a:rPr lang="en-US" smtClean="0"/>
-              <a:t>‹Nr.›</a:t>
+              <a:t>‹#›</a:t>
             </a:fld>
             <a:endParaRPr lang="en-US"/>
           </a:p>
@@ -2368,7 +2369,7 @@
           <a:p>
             <a:fld id="{F3B505E5-71AA-4F56-A163-12C04BFEC044}" type="datetimeFigureOut">
               <a:rPr lang="en-US" smtClean="0"/>
-              <a:t>12/11/2017</a:t>
+              <a:t>10/29/2018</a:t>
             </a:fld>
             <a:endParaRPr lang="en-US"/>
           </a:p>
@@ -2410,7 +2411,7 @@
           <a:p>
             <a:fld id="{F1182DC5-15AB-4F5F-8870-C4F577B151D1}" type="slidenum">
               <a:rPr lang="en-US" smtClean="0"/>
-              <a:t>‹Nr.›</a:t>
+              <a:t>‹#›</a:t>
             </a:fld>
             <a:endParaRPr lang="en-US"/>
           </a:p>
@@ -2581,7 +2582,7 @@
           <a:p>
             <a:fld id="{F3B505E5-71AA-4F56-A163-12C04BFEC044}" type="datetimeFigureOut">
               <a:rPr lang="en-US" smtClean="0"/>
-              <a:t>12/11/2017</a:t>
+              <a:t>10/29/2018</a:t>
             </a:fld>
             <a:endParaRPr lang="en-US"/>
           </a:p>
@@ -2659,7 +2660,7 @@
           <a:p>
             <a:fld id="{F1182DC5-15AB-4F5F-8870-C4F577B151D1}" type="slidenum">
               <a:rPr lang="en-US" smtClean="0"/>
-              <a:t>‹Nr.›</a:t>
+              <a:t>‹#›</a:t>
             </a:fld>
             <a:endParaRPr lang="en-US"/>
           </a:p>
@@ -6241,7 +6242,7 @@
         </p:nvSpPr>
         <p:spPr>
           <a:xfrm>
-            <a:off x="1242575" y="1373764"/>
+            <a:off x="1242575" y="1148609"/>
             <a:ext cx="2936760" cy="777546"/>
           </a:xfrm>
           <a:prstGeom prst="roundRect">
@@ -6321,7 +6322,7 @@
         </p:nvSpPr>
         <p:spPr>
           <a:xfrm>
-            <a:off x="1930783" y="2157769"/>
+            <a:off x="1930783" y="1932614"/>
             <a:ext cx="1539109" cy="777546"/>
           </a:xfrm>
           <a:prstGeom prst="roundRect">
@@ -6456,7 +6457,7 @@
           </a:lstStyle>
           <a:p>
             <a:r>
-              <a:rPr lang="de-DE" sz="6000" dirty="0" smtClean="0">
+              <a:rPr lang="de-DE" sz="6000" smtClean="0">
                 <a:solidFill>
                   <a:schemeClr val="tx1">
                     <a:lumMod val="85000"/>
@@ -6465,7 +6466,7 @@
                 </a:solidFill>
                 <a:latin typeface="Impact" panose="020B0806030902050204" pitchFamily="34" charset="0"/>
               </a:rPr>
-              <a:t>2017</a:t>
+              <a:t>2019</a:t>
             </a:r>
             <a:endParaRPr lang="en-US" sz="6000" dirty="0">
               <a:solidFill>
@@ -7470,7 +7471,7 @@
         </p:nvSpPr>
         <p:spPr>
           <a:xfrm>
-            <a:off x="1242575" y="1373764"/>
+            <a:off x="1242575" y="1148609"/>
             <a:ext cx="2936760" cy="777546"/>
           </a:xfrm>
           <a:prstGeom prst="roundRect">
@@ -7550,7 +7551,7 @@
         </p:nvSpPr>
         <p:spPr>
           <a:xfrm>
-            <a:off x="1930783" y="2157769"/>
+            <a:off x="1930783" y="1932614"/>
             <a:ext cx="1539109" cy="777546"/>
           </a:xfrm>
           <a:prstGeom prst="roundRect">
@@ -7685,6 +7686,1235 @@
           </a:lstStyle>
           <a:p>
             <a:r>
+              <a:rPr lang="de-DE" sz="6000" dirty="0" smtClean="0">
+                <a:solidFill>
+                  <a:schemeClr val="tx1">
+                    <a:lumMod val="85000"/>
+                    <a:lumOff val="15000"/>
+                  </a:schemeClr>
+                </a:solidFill>
+                <a:latin typeface="Impact" panose="020B0806030902050204" pitchFamily="34" charset="0"/>
+              </a:rPr>
+              <a:t>2018</a:t>
+            </a:r>
+            <a:endParaRPr lang="en-US" sz="6000" dirty="0">
+              <a:solidFill>
+                <a:schemeClr val="tx1">
+                  <a:lumMod val="85000"/>
+                  <a:lumOff val="15000"/>
+                </a:schemeClr>
+              </a:solidFill>
+              <a:latin typeface="Impact" panose="020B0806030902050204" pitchFamily="34" charset="0"/>
+            </a:endParaRPr>
+          </a:p>
+        </p:txBody>
+      </p:sp>
+    </p:spTree>
+    <p:extLst>
+      <p:ext uri="{BB962C8B-B14F-4D97-AF65-F5344CB8AC3E}">
+        <p14:creationId xmlns:p14="http://schemas.microsoft.com/office/powerpoint/2010/main" val="2606216451"/>
+      </p:ext>
+    </p:extLst>
+  </p:cSld>
+  <p:clrMapOvr>
+    <a:masterClrMapping/>
+  </p:clrMapOvr>
+  <p:timing>
+    <p:tnLst>
+      <p:par>
+        <p:cTn id="1" dur="indefinite" restart="never" nodeType="tmRoot"/>
+      </p:par>
+    </p:tnLst>
+  </p:timing>
+</p:sld>
+</file>
+
+<file path=ppt/slides/slide5.xml><?xml version="1.0" encoding="utf-8"?>
+<p:sld xmlns:a="http://schemas.openxmlformats.org/drawingml/2006/main" xmlns:r="http://schemas.openxmlformats.org/officeDocument/2006/relationships" xmlns:p="http://schemas.openxmlformats.org/presentationml/2006/main">
+  <p:cSld>
+    <p:spTree>
+      <p:nvGrpSpPr>
+        <p:cNvPr id="1" name=""/>
+        <p:cNvGrpSpPr/>
+        <p:nvPr/>
+      </p:nvGrpSpPr>
+      <p:grpSpPr>
+        <a:xfrm>
+          <a:off x="0" y="0"/>
+          <a:ext cx="0" cy="0"/>
+          <a:chOff x="0" y="0"/>
+          <a:chExt cx="0" cy="0"/>
+        </a:xfrm>
+      </p:grpSpPr>
+      <p:cxnSp>
+        <p:nvCxnSpPr>
+          <p:cNvPr id="17" name="Gerader Verbinder 16"/>
+          <p:cNvCxnSpPr>
+            <a:endCxn id="10" idx="0"/>
+          </p:cNvCxnSpPr>
+          <p:nvPr/>
+        </p:nvCxnSpPr>
+        <p:spPr>
+          <a:xfrm>
+            <a:off x="1457992" y="891461"/>
+            <a:ext cx="2388445" cy="1709092"/>
+          </a:xfrm>
+          <a:prstGeom prst="line">
+            <a:avLst/>
+          </a:prstGeom>
+          <a:ln w="38100">
+            <a:solidFill>
+              <a:schemeClr val="bg1">
+                <a:lumMod val="65000"/>
+              </a:schemeClr>
+            </a:solidFill>
+          </a:ln>
+        </p:spPr>
+        <p:style>
+          <a:lnRef idx="1">
+            <a:schemeClr val="accent1"/>
+          </a:lnRef>
+          <a:fillRef idx="0">
+            <a:schemeClr val="accent1"/>
+          </a:fillRef>
+          <a:effectRef idx="0">
+            <a:schemeClr val="accent1"/>
+          </a:effectRef>
+          <a:fontRef idx="minor">
+            <a:schemeClr val="tx1"/>
+          </a:fontRef>
+        </p:style>
+      </p:cxnSp>
+      <p:cxnSp>
+        <p:nvCxnSpPr>
+          <p:cNvPr id="18" name="Gerader Verbinder 17"/>
+          <p:cNvCxnSpPr/>
+          <p:nvPr/>
+        </p:nvCxnSpPr>
+        <p:spPr>
+          <a:xfrm>
+            <a:off x="830729" y="1605710"/>
+            <a:ext cx="4094275" cy="673933"/>
+          </a:xfrm>
+          <a:prstGeom prst="line">
+            <a:avLst/>
+          </a:prstGeom>
+          <a:ln w="38100">
+            <a:solidFill>
+              <a:schemeClr val="bg1">
+                <a:lumMod val="65000"/>
+              </a:schemeClr>
+            </a:solidFill>
+          </a:ln>
+        </p:spPr>
+        <p:style>
+          <a:lnRef idx="1">
+            <a:schemeClr val="accent1"/>
+          </a:lnRef>
+          <a:fillRef idx="0">
+            <a:schemeClr val="accent1"/>
+          </a:fillRef>
+          <a:effectRef idx="0">
+            <a:schemeClr val="accent1"/>
+          </a:effectRef>
+          <a:fontRef idx="minor">
+            <a:schemeClr val="tx1"/>
+          </a:fontRef>
+        </p:style>
+      </p:cxnSp>
+      <p:cxnSp>
+        <p:nvCxnSpPr>
+          <p:cNvPr id="21" name="Gerader Verbinder 20"/>
+          <p:cNvCxnSpPr/>
+          <p:nvPr/>
+        </p:nvCxnSpPr>
+        <p:spPr>
+          <a:xfrm flipV="1">
+            <a:off x="712102" y="1406357"/>
+            <a:ext cx="3674415" cy="1123006"/>
+          </a:xfrm>
+          <a:prstGeom prst="line">
+            <a:avLst/>
+          </a:prstGeom>
+          <a:ln w="38100">
+            <a:solidFill>
+              <a:schemeClr val="bg1">
+                <a:lumMod val="65000"/>
+              </a:schemeClr>
+            </a:solidFill>
+          </a:ln>
+        </p:spPr>
+        <p:style>
+          <a:lnRef idx="1">
+            <a:schemeClr val="accent1"/>
+          </a:lnRef>
+          <a:fillRef idx="0">
+            <a:schemeClr val="accent1"/>
+          </a:fillRef>
+          <a:effectRef idx="0">
+            <a:schemeClr val="accent1"/>
+          </a:effectRef>
+          <a:fontRef idx="minor">
+            <a:schemeClr val="tx1"/>
+          </a:fontRef>
+        </p:style>
+      </p:cxnSp>
+      <p:cxnSp>
+        <p:nvCxnSpPr>
+          <p:cNvPr id="24" name="Gerader Verbinder 23"/>
+          <p:cNvCxnSpPr/>
+          <p:nvPr/>
+        </p:nvCxnSpPr>
+        <p:spPr>
+          <a:xfrm flipH="1" flipV="1">
+            <a:off x="678710" y="902448"/>
+            <a:ext cx="4019776" cy="1880678"/>
+          </a:xfrm>
+          <a:prstGeom prst="line">
+            <a:avLst/>
+          </a:prstGeom>
+          <a:ln w="38100">
+            <a:solidFill>
+              <a:schemeClr val="bg1">
+                <a:lumMod val="65000"/>
+              </a:schemeClr>
+            </a:solidFill>
+          </a:ln>
+        </p:spPr>
+        <p:style>
+          <a:lnRef idx="1">
+            <a:schemeClr val="accent1"/>
+          </a:lnRef>
+          <a:fillRef idx="0">
+            <a:schemeClr val="accent1"/>
+          </a:fillRef>
+          <a:effectRef idx="0">
+            <a:schemeClr val="accent1"/>
+          </a:effectRef>
+          <a:fontRef idx="minor">
+            <a:schemeClr val="tx1"/>
+          </a:fontRef>
+        </p:style>
+      </p:cxnSp>
+      <p:pic>
+        <p:nvPicPr>
+          <p:cNvPr id="4" name="Grafik 3"/>
+          <p:cNvPicPr>
+            <a:picLocks noChangeAspect="1"/>
+          </p:cNvPicPr>
+          <p:nvPr/>
+        </p:nvPicPr>
+        <p:blipFill>
+          <a:blip r:embed="rId2" cstate="print">
+            <a:duotone>
+              <a:schemeClr val="bg2">
+                <a:shade val="45000"/>
+                <a:satMod val="135000"/>
+              </a:schemeClr>
+              <a:prstClr val="white"/>
+            </a:duotone>
+            <a:extLst>
+              <a:ext uri="{28A0092B-C50C-407E-A947-70E740481C1C}">
+                <a14:useLocalDpi xmlns:a14="http://schemas.microsoft.com/office/drawing/2010/main" val="0"/>
+              </a:ext>
+            </a:extLst>
+          </a:blip>
+          <a:stretch>
+            <a:fillRect/>
+          </a:stretch>
+        </p:blipFill>
+        <p:spPr>
+          <a:xfrm>
+            <a:off x="20607" y="1301170"/>
+            <a:ext cx="1029642" cy="805695"/>
+          </a:xfrm>
+          <a:prstGeom prst="rect">
+            <a:avLst/>
+          </a:prstGeom>
+        </p:spPr>
+      </p:pic>
+      <p:pic>
+        <p:nvPicPr>
+          <p:cNvPr id="5" name="Grafik 4"/>
+          <p:cNvPicPr>
+            <a:picLocks noChangeAspect="1"/>
+          </p:cNvPicPr>
+          <p:nvPr/>
+        </p:nvPicPr>
+        <p:blipFill>
+          <a:blip r:embed="rId3" cstate="print">
+            <a:duotone>
+              <a:schemeClr val="bg2">
+                <a:shade val="45000"/>
+                <a:satMod val="135000"/>
+              </a:schemeClr>
+              <a:prstClr val="white"/>
+            </a:duotone>
+            <a:extLst>
+              <a:ext uri="{BEBA8EAE-BF5A-486C-A8C5-ECC9F3942E4B}">
+                <a14:imgProps xmlns:a14="http://schemas.microsoft.com/office/drawing/2010/main">
+                  <a14:imgLayer r:embed="rId4">
+                    <a14:imgEffect>
+                      <a14:brightnessContrast bright="-20000" contrast="-40000"/>
+                    </a14:imgEffect>
+                  </a14:imgLayer>
+                </a14:imgProps>
+              </a:ext>
+              <a:ext uri="{28A0092B-C50C-407E-A947-70E740481C1C}">
+                <a14:useLocalDpi xmlns:a14="http://schemas.microsoft.com/office/drawing/2010/main" val="0"/>
+              </a:ext>
+            </a:extLst>
+          </a:blip>
+          <a:stretch>
+            <a:fillRect/>
+          </a:stretch>
+        </p:blipFill>
+        <p:spPr>
+          <a:xfrm>
+            <a:off x="4288332" y="1133049"/>
+            <a:ext cx="863594" cy="660650"/>
+          </a:xfrm>
+          <a:prstGeom prst="rect">
+            <a:avLst/>
+          </a:prstGeom>
+        </p:spPr>
+      </p:pic>
+      <p:pic>
+        <p:nvPicPr>
+          <p:cNvPr id="8" name="Grafik 7"/>
+          <p:cNvPicPr>
+            <a:picLocks noChangeAspect="1"/>
+          </p:cNvPicPr>
+          <p:nvPr/>
+        </p:nvPicPr>
+        <p:blipFill>
+          <a:blip r:embed="rId5" cstate="print">
+            <a:duotone>
+              <a:schemeClr val="bg2">
+                <a:shade val="45000"/>
+                <a:satMod val="135000"/>
+              </a:schemeClr>
+              <a:prstClr val="white"/>
+            </a:duotone>
+            <a:extLst>
+              <a:ext uri="{BEBA8EAE-BF5A-486C-A8C5-ECC9F3942E4B}">
+                <a14:imgProps xmlns:a14="http://schemas.microsoft.com/office/drawing/2010/main">
+                  <a14:imgLayer r:embed="rId6">
+                    <a14:imgEffect>
+                      <a14:brightnessContrast bright="-20000" contrast="20000"/>
+                    </a14:imgEffect>
+                  </a14:imgLayer>
+                </a14:imgProps>
+              </a:ext>
+              <a:ext uri="{28A0092B-C50C-407E-A947-70E740481C1C}">
+                <a14:useLocalDpi xmlns:a14="http://schemas.microsoft.com/office/drawing/2010/main" val="0"/>
+              </a:ext>
+            </a:extLst>
+          </a:blip>
+          <a:stretch>
+            <a:fillRect/>
+          </a:stretch>
+        </p:blipFill>
+        <p:spPr>
+          <a:xfrm>
+            <a:off x="879217" y="45253"/>
+            <a:ext cx="797734" cy="919578"/>
+          </a:xfrm>
+          <a:prstGeom prst="rect">
+            <a:avLst/>
+          </a:prstGeom>
+        </p:spPr>
+      </p:pic>
+      <p:pic>
+        <p:nvPicPr>
+          <p:cNvPr id="10" name="Grafik 9"/>
+          <p:cNvPicPr>
+            <a:picLocks noChangeAspect="1"/>
+          </p:cNvPicPr>
+          <p:nvPr/>
+        </p:nvPicPr>
+        <p:blipFill>
+          <a:blip r:embed="rId7" cstate="print">
+            <a:duotone>
+              <a:schemeClr val="bg2">
+                <a:shade val="45000"/>
+                <a:satMod val="135000"/>
+              </a:schemeClr>
+              <a:prstClr val="white"/>
+            </a:duotone>
+            <a:extLst>
+              <a:ext uri="{BEBA8EAE-BF5A-486C-A8C5-ECC9F3942E4B}">
+                <a14:imgProps xmlns:a14="http://schemas.microsoft.com/office/drawing/2010/main">
+                  <a14:imgLayer r:embed="rId8">
+                    <a14:imgEffect>
+                      <a14:brightnessContrast bright="-20000" contrast="20000"/>
+                    </a14:imgEffect>
+                  </a14:imgLayer>
+                </a14:imgProps>
+              </a:ext>
+              <a:ext uri="{28A0092B-C50C-407E-A947-70E740481C1C}">
+                <a14:useLocalDpi xmlns:a14="http://schemas.microsoft.com/office/drawing/2010/main" val="0"/>
+              </a:ext>
+            </a:extLst>
+          </a:blip>
+          <a:stretch>
+            <a:fillRect/>
+          </a:stretch>
+        </p:blipFill>
+        <p:spPr>
+          <a:xfrm>
+            <a:off x="3387277" y="2600553"/>
+            <a:ext cx="918319" cy="696337"/>
+          </a:xfrm>
+          <a:prstGeom prst="rect">
+            <a:avLst/>
+          </a:prstGeom>
+        </p:spPr>
+      </p:pic>
+      <p:pic>
+        <p:nvPicPr>
+          <p:cNvPr id="12" name="Grafik 11"/>
+          <p:cNvPicPr>
+            <a:picLocks noChangeAspect="1"/>
+          </p:cNvPicPr>
+          <p:nvPr/>
+        </p:nvPicPr>
+        <p:blipFill>
+          <a:blip r:embed="rId9" cstate="print">
+            <a:duotone>
+              <a:schemeClr val="bg2">
+                <a:shade val="45000"/>
+                <a:satMod val="135000"/>
+              </a:schemeClr>
+              <a:prstClr val="white"/>
+            </a:duotone>
+            <a:extLst>
+              <a:ext uri="{28A0092B-C50C-407E-A947-70E740481C1C}">
+                <a14:useLocalDpi xmlns:a14="http://schemas.microsoft.com/office/drawing/2010/main" val="0"/>
+              </a:ext>
+            </a:extLst>
+          </a:blip>
+          <a:stretch>
+            <a:fillRect/>
+          </a:stretch>
+        </p:blipFill>
+        <p:spPr>
+          <a:xfrm>
+            <a:off x="1492394" y="2589456"/>
+            <a:ext cx="640574" cy="640574"/>
+          </a:xfrm>
+          <a:prstGeom prst="rect">
+            <a:avLst/>
+          </a:prstGeom>
+        </p:spPr>
+      </p:pic>
+      <p:pic>
+        <p:nvPicPr>
+          <p:cNvPr id="13" name="Grafik 12"/>
+          <p:cNvPicPr>
+            <a:picLocks noChangeAspect="1"/>
+          </p:cNvPicPr>
+          <p:nvPr/>
+        </p:nvPicPr>
+        <p:blipFill>
+          <a:blip r:embed="rId10" cstate="print">
+            <a:duotone>
+              <a:schemeClr val="bg2">
+                <a:shade val="45000"/>
+                <a:satMod val="135000"/>
+              </a:schemeClr>
+              <a:prstClr val="white"/>
+            </a:duotone>
+            <a:extLst>
+              <a:ext uri="{28A0092B-C50C-407E-A947-70E740481C1C}">
+                <a14:useLocalDpi xmlns:a14="http://schemas.microsoft.com/office/drawing/2010/main" val="0"/>
+              </a:ext>
+            </a:extLst>
+          </a:blip>
+          <a:stretch>
+            <a:fillRect/>
+          </a:stretch>
+        </p:blipFill>
+        <p:spPr>
+          <a:xfrm>
+            <a:off x="2852178" y="2284528"/>
+            <a:ext cx="567448" cy="1033805"/>
+          </a:xfrm>
+          <a:prstGeom prst="rect">
+            <a:avLst/>
+          </a:prstGeom>
+        </p:spPr>
+      </p:pic>
+      <p:pic>
+        <p:nvPicPr>
+          <p:cNvPr id="14" name="Grafik 13"/>
+          <p:cNvPicPr>
+            <a:picLocks noChangeAspect="1"/>
+          </p:cNvPicPr>
+          <p:nvPr/>
+        </p:nvPicPr>
+        <p:blipFill>
+          <a:blip r:embed="rId11" cstate="print">
+            <a:duotone>
+              <a:schemeClr val="bg2">
+                <a:shade val="45000"/>
+                <a:satMod val="135000"/>
+              </a:schemeClr>
+              <a:prstClr val="white"/>
+            </a:duotone>
+            <a:extLst>
+              <a:ext uri="{28A0092B-C50C-407E-A947-70E740481C1C}">
+                <a14:useLocalDpi xmlns:a14="http://schemas.microsoft.com/office/drawing/2010/main" val="0"/>
+              </a:ext>
+            </a:extLst>
+          </a:blip>
+          <a:stretch>
+            <a:fillRect/>
+          </a:stretch>
+        </p:blipFill>
+        <p:spPr>
+          <a:xfrm>
+            <a:off x="3380595" y="526382"/>
+            <a:ext cx="964268" cy="376065"/>
+          </a:xfrm>
+          <a:prstGeom prst="rect">
+            <a:avLst/>
+          </a:prstGeom>
+        </p:spPr>
+      </p:pic>
+      <p:pic>
+        <p:nvPicPr>
+          <p:cNvPr id="15" name="Grafik 14"/>
+          <p:cNvPicPr>
+            <a:picLocks noChangeAspect="1"/>
+          </p:cNvPicPr>
+          <p:nvPr/>
+        </p:nvPicPr>
+        <p:blipFill>
+          <a:blip r:embed="rId12" cstate="print">
+            <a:duotone>
+              <a:schemeClr val="bg2">
+                <a:shade val="45000"/>
+                <a:satMod val="135000"/>
+              </a:schemeClr>
+              <a:prstClr val="white"/>
+            </a:duotone>
+            <a:extLst>
+              <a:ext uri="{28A0092B-C50C-407E-A947-70E740481C1C}">
+                <a14:useLocalDpi xmlns:a14="http://schemas.microsoft.com/office/drawing/2010/main" val="0"/>
+              </a:ext>
+            </a:extLst>
+          </a:blip>
+          <a:stretch>
+            <a:fillRect/>
+          </a:stretch>
+        </p:blipFill>
+        <p:spPr>
+          <a:xfrm>
+            <a:off x="2138081" y="-157538"/>
+            <a:ext cx="1583343" cy="1120215"/>
+          </a:xfrm>
+          <a:prstGeom prst="rect">
+            <a:avLst/>
+          </a:prstGeom>
+        </p:spPr>
+      </p:pic>
+      <p:pic>
+        <p:nvPicPr>
+          <p:cNvPr id="3" name="Grafik 2"/>
+          <p:cNvPicPr>
+            <a:picLocks noChangeAspect="1"/>
+          </p:cNvPicPr>
+          <p:nvPr/>
+        </p:nvPicPr>
+        <p:blipFill>
+          <a:blip r:embed="rId13" cstate="print">
+            <a:duotone>
+              <a:schemeClr val="bg2">
+                <a:shade val="45000"/>
+                <a:satMod val="135000"/>
+              </a:schemeClr>
+              <a:prstClr val="white"/>
+            </a:duotone>
+            <a:extLst>
+              <a:ext uri="{28A0092B-C50C-407E-A947-70E740481C1C}">
+                <a14:useLocalDpi xmlns:a14="http://schemas.microsoft.com/office/drawing/2010/main" val="0"/>
+              </a:ext>
+            </a:extLst>
+          </a:blip>
+          <a:stretch>
+            <a:fillRect/>
+          </a:stretch>
+        </p:blipFill>
+        <p:spPr>
+          <a:xfrm>
+            <a:off x="4712338" y="1888042"/>
+            <a:ext cx="554039" cy="730199"/>
+          </a:xfrm>
+          <a:prstGeom prst="rect">
+            <a:avLst/>
+          </a:prstGeom>
+        </p:spPr>
+      </p:pic>
+      <p:pic>
+        <p:nvPicPr>
+          <p:cNvPr id="6" name="Grafik 5"/>
+          <p:cNvPicPr>
+            <a:picLocks noChangeAspect="1"/>
+          </p:cNvPicPr>
+          <p:nvPr/>
+        </p:nvPicPr>
+        <p:blipFill>
+          <a:blip r:embed="rId14" cstate="print">
+            <a:duotone>
+              <a:schemeClr val="bg2">
+                <a:shade val="45000"/>
+                <a:satMod val="135000"/>
+              </a:schemeClr>
+              <a:prstClr val="white"/>
+            </a:duotone>
+            <a:extLst>
+              <a:ext uri="{28A0092B-C50C-407E-A947-70E740481C1C}">
+                <a14:useLocalDpi xmlns:a14="http://schemas.microsoft.com/office/drawing/2010/main" val="0"/>
+              </a:ext>
+            </a:extLst>
+          </a:blip>
+          <a:stretch>
+            <a:fillRect/>
+          </a:stretch>
+        </p:blipFill>
+        <p:spPr>
+          <a:xfrm>
+            <a:off x="2275622" y="2712961"/>
+            <a:ext cx="468265" cy="791992"/>
+          </a:xfrm>
+          <a:prstGeom prst="rect">
+            <a:avLst/>
+          </a:prstGeom>
+        </p:spPr>
+      </p:pic>
+      <p:pic>
+        <p:nvPicPr>
+          <p:cNvPr id="7" name="Grafik 6"/>
+          <p:cNvPicPr>
+            <a:picLocks noChangeAspect="1"/>
+          </p:cNvPicPr>
+          <p:nvPr/>
+        </p:nvPicPr>
+        <p:blipFill>
+          <a:blip r:embed="rId15" cstate="print">
+            <a:clrChange>
+              <a:clrFrom>
+                <a:srgbClr val="000000"/>
+              </a:clrFrom>
+              <a:clrTo>
+                <a:srgbClr val="000000">
+                  <a:alpha val="0"/>
+                </a:srgbClr>
+              </a:clrTo>
+            </a:clrChange>
+            <a:duotone>
+              <a:schemeClr val="bg2">
+                <a:shade val="45000"/>
+                <a:satMod val="135000"/>
+              </a:schemeClr>
+              <a:prstClr val="white"/>
+            </a:duotone>
+            <a:extLst>
+              <a:ext uri="{BEBA8EAE-BF5A-486C-A8C5-ECC9F3942E4B}">
+                <a14:imgProps xmlns:a14="http://schemas.microsoft.com/office/drawing/2010/main">
+                  <a14:imgLayer r:embed="rId16">
+                    <a14:imgEffect>
+                      <a14:brightnessContrast bright="-40000"/>
+                    </a14:imgEffect>
+                  </a14:imgLayer>
+                </a14:imgProps>
+              </a:ext>
+              <a:ext uri="{28A0092B-C50C-407E-A947-70E740481C1C}">
+                <a14:useLocalDpi xmlns:a14="http://schemas.microsoft.com/office/drawing/2010/main" val="0"/>
+              </a:ext>
+            </a:extLst>
+          </a:blip>
+          <a:stretch>
+            <a:fillRect/>
+          </a:stretch>
+        </p:blipFill>
+        <p:spPr>
+          <a:xfrm>
+            <a:off x="452192" y="414150"/>
+            <a:ext cx="259910" cy="745665"/>
+          </a:xfrm>
+          <a:prstGeom prst="rect">
+            <a:avLst/>
+          </a:prstGeom>
+        </p:spPr>
+      </p:pic>
+      <p:pic>
+        <p:nvPicPr>
+          <p:cNvPr id="9" name="Grafik 8"/>
+          <p:cNvPicPr>
+            <a:picLocks noChangeAspect="1"/>
+          </p:cNvPicPr>
+          <p:nvPr/>
+        </p:nvPicPr>
+        <p:blipFill>
+          <a:blip r:embed="rId17" cstate="print">
+            <a:duotone>
+              <a:schemeClr val="bg2">
+                <a:shade val="45000"/>
+                <a:satMod val="135000"/>
+              </a:schemeClr>
+              <a:prstClr val="white"/>
+            </a:duotone>
+            <a:extLst>
+              <a:ext uri="{28A0092B-C50C-407E-A947-70E740481C1C}">
+                <a14:useLocalDpi xmlns:a14="http://schemas.microsoft.com/office/drawing/2010/main" val="0"/>
+              </a:ext>
+            </a:extLst>
+          </a:blip>
+          <a:stretch>
+            <a:fillRect/>
+          </a:stretch>
+        </p:blipFill>
+        <p:spPr>
+          <a:xfrm>
+            <a:off x="4516668" y="438051"/>
+            <a:ext cx="597112" cy="618078"/>
+          </a:xfrm>
+          <a:prstGeom prst="rect">
+            <a:avLst/>
+          </a:prstGeom>
+        </p:spPr>
+      </p:pic>
+      <p:pic>
+        <p:nvPicPr>
+          <p:cNvPr id="11" name="Grafik 10"/>
+          <p:cNvPicPr>
+            <a:picLocks noChangeAspect="1"/>
+          </p:cNvPicPr>
+          <p:nvPr/>
+        </p:nvPicPr>
+        <p:blipFill rotWithShape="1">
+          <a:blip r:embed="rId18" cstate="print">
+            <a:duotone>
+              <a:schemeClr val="bg2">
+                <a:shade val="45000"/>
+                <a:satMod val="135000"/>
+              </a:schemeClr>
+              <a:prstClr val="white"/>
+            </a:duotone>
+            <a:extLst>
+              <a:ext uri="{28A0092B-C50C-407E-A947-70E740481C1C}">
+                <a14:useLocalDpi xmlns:a14="http://schemas.microsoft.com/office/drawing/2010/main" val="0"/>
+              </a:ext>
+            </a:extLst>
+          </a:blip>
+          <a:srcRect b="56850"/>
+          <a:stretch/>
+        </p:blipFill>
+        <p:spPr>
+          <a:xfrm>
+            <a:off x="48390" y="2219335"/>
+            <a:ext cx="898146" cy="547771"/>
+          </a:xfrm>
+          <a:prstGeom prst="rect">
+            <a:avLst/>
+          </a:prstGeom>
+        </p:spPr>
+      </p:pic>
+      <p:cxnSp>
+        <p:nvCxnSpPr>
+          <p:cNvPr id="25" name="Gerader Verbinder 24"/>
+          <p:cNvCxnSpPr>
+            <a:stCxn id="14" idx="2"/>
+            <a:endCxn id="12" idx="0"/>
+          </p:cNvCxnSpPr>
+          <p:nvPr/>
+        </p:nvCxnSpPr>
+        <p:spPr>
+          <a:xfrm flipH="1">
+            <a:off x="1812681" y="902447"/>
+            <a:ext cx="2050048" cy="1687009"/>
+          </a:xfrm>
+          <a:prstGeom prst="line">
+            <a:avLst/>
+          </a:prstGeom>
+          <a:ln w="38100">
+            <a:solidFill>
+              <a:schemeClr val="bg1">
+                <a:lumMod val="65000"/>
+              </a:schemeClr>
+            </a:solidFill>
+          </a:ln>
+        </p:spPr>
+        <p:style>
+          <a:lnRef idx="1">
+            <a:schemeClr val="accent1"/>
+          </a:lnRef>
+          <a:fillRef idx="0">
+            <a:schemeClr val="accent1"/>
+          </a:fillRef>
+          <a:effectRef idx="0">
+            <a:schemeClr val="accent1"/>
+          </a:effectRef>
+          <a:fontRef idx="minor">
+            <a:schemeClr val="tx1"/>
+          </a:fontRef>
+        </p:style>
+      </p:cxnSp>
+      <p:cxnSp>
+        <p:nvCxnSpPr>
+          <p:cNvPr id="31" name="Gerader Verbinder 30"/>
+          <p:cNvCxnSpPr>
+            <a:stCxn id="37" idx="2"/>
+          </p:cNvCxnSpPr>
+          <p:nvPr/>
+        </p:nvCxnSpPr>
+        <p:spPr>
+          <a:xfrm>
+            <a:off x="2092957" y="701732"/>
+            <a:ext cx="1064444" cy="1898710"/>
+          </a:xfrm>
+          <a:prstGeom prst="line">
+            <a:avLst/>
+          </a:prstGeom>
+          <a:ln w="38100">
+            <a:solidFill>
+              <a:schemeClr val="bg1">
+                <a:lumMod val="65000"/>
+              </a:schemeClr>
+            </a:solidFill>
+          </a:ln>
+        </p:spPr>
+        <p:style>
+          <a:lnRef idx="1">
+            <a:schemeClr val="accent1"/>
+          </a:lnRef>
+          <a:fillRef idx="0">
+            <a:schemeClr val="accent1"/>
+          </a:fillRef>
+          <a:effectRef idx="0">
+            <a:schemeClr val="accent1"/>
+          </a:effectRef>
+          <a:fontRef idx="minor">
+            <a:schemeClr val="tx1"/>
+          </a:fontRef>
+        </p:style>
+      </p:cxnSp>
+      <p:cxnSp>
+        <p:nvCxnSpPr>
+          <p:cNvPr id="34" name="Gerader Verbinder 33"/>
+          <p:cNvCxnSpPr>
+            <a:endCxn id="6" idx="0"/>
+          </p:cNvCxnSpPr>
+          <p:nvPr/>
+        </p:nvCxnSpPr>
+        <p:spPr>
+          <a:xfrm flipH="1">
+            <a:off x="2509755" y="684221"/>
+            <a:ext cx="255381" cy="2028740"/>
+          </a:xfrm>
+          <a:prstGeom prst="line">
+            <a:avLst/>
+          </a:prstGeom>
+          <a:ln w="38100">
+            <a:solidFill>
+              <a:schemeClr val="bg1">
+                <a:lumMod val="65000"/>
+              </a:schemeClr>
+            </a:solidFill>
+          </a:ln>
+        </p:spPr>
+        <p:style>
+          <a:lnRef idx="1">
+            <a:schemeClr val="accent1"/>
+          </a:lnRef>
+          <a:fillRef idx="0">
+            <a:schemeClr val="accent1"/>
+          </a:fillRef>
+          <a:effectRef idx="0">
+            <a:schemeClr val="accent1"/>
+          </a:effectRef>
+          <a:fontRef idx="minor">
+            <a:schemeClr val="tx1"/>
+          </a:fontRef>
+        </p:style>
+      </p:cxnSp>
+      <p:pic>
+        <p:nvPicPr>
+          <p:cNvPr id="37" name="Grafik 36"/>
+          <p:cNvPicPr>
+            <a:picLocks noChangeAspect="1"/>
+          </p:cNvPicPr>
+          <p:nvPr/>
+        </p:nvPicPr>
+        <p:blipFill>
+          <a:blip r:embed="rId19" cstate="print">
+            <a:duotone>
+              <a:schemeClr val="bg2">
+                <a:shade val="45000"/>
+                <a:satMod val="135000"/>
+              </a:schemeClr>
+              <a:prstClr val="white"/>
+            </a:duotone>
+            <a:extLst>
+              <a:ext uri="{28A0092B-C50C-407E-A947-70E740481C1C}">
+                <a14:useLocalDpi xmlns:a14="http://schemas.microsoft.com/office/drawing/2010/main" val="0"/>
+              </a:ext>
+            </a:extLst>
+          </a:blip>
+          <a:stretch>
+            <a:fillRect/>
+          </a:stretch>
+        </p:blipFill>
+        <p:spPr>
+          <a:xfrm>
+            <a:off x="1859850" y="75943"/>
+            <a:ext cx="466213" cy="625789"/>
+          </a:xfrm>
+          <a:prstGeom prst="rect">
+            <a:avLst/>
+          </a:prstGeom>
+        </p:spPr>
+      </p:pic>
+      <p:pic>
+        <p:nvPicPr>
+          <p:cNvPr id="38" name="Grafik 37"/>
+          <p:cNvPicPr>
+            <a:picLocks noChangeAspect="1"/>
+          </p:cNvPicPr>
+          <p:nvPr/>
+        </p:nvPicPr>
+        <p:blipFill>
+          <a:blip r:embed="rId20" cstate="print">
+            <a:duotone>
+              <a:schemeClr val="bg2">
+                <a:shade val="45000"/>
+                <a:satMod val="135000"/>
+              </a:schemeClr>
+              <a:prstClr val="white"/>
+            </a:duotone>
+            <a:extLst>
+              <a:ext uri="{28A0092B-C50C-407E-A947-70E740481C1C}">
+                <a14:useLocalDpi xmlns:a14="http://schemas.microsoft.com/office/drawing/2010/main" val="0"/>
+              </a:ext>
+            </a:extLst>
+          </a:blip>
+          <a:stretch>
+            <a:fillRect/>
+          </a:stretch>
+        </p:blipFill>
+        <p:spPr>
+          <a:xfrm>
+            <a:off x="4535472" y="2659776"/>
+            <a:ext cx="502689" cy="785452"/>
+          </a:xfrm>
+          <a:prstGeom prst="rect">
+            <a:avLst/>
+          </a:prstGeom>
+        </p:spPr>
+      </p:pic>
+      <p:pic>
+        <p:nvPicPr>
+          <p:cNvPr id="39" name="Grafik 38"/>
+          <p:cNvPicPr>
+            <a:picLocks noChangeAspect="1"/>
+          </p:cNvPicPr>
+          <p:nvPr/>
+        </p:nvPicPr>
+        <p:blipFill>
+          <a:blip r:embed="rId21" cstate="print">
+            <a:duotone>
+              <a:schemeClr val="bg2">
+                <a:shade val="45000"/>
+                <a:satMod val="135000"/>
+              </a:schemeClr>
+              <a:prstClr val="white"/>
+            </a:duotone>
+            <a:extLst>
+              <a:ext uri="{28A0092B-C50C-407E-A947-70E740481C1C}">
+                <a14:useLocalDpi xmlns:a14="http://schemas.microsoft.com/office/drawing/2010/main" val="0"/>
+              </a:ext>
+            </a:extLst>
+          </a:blip>
+          <a:stretch>
+            <a:fillRect/>
+          </a:stretch>
+        </p:blipFill>
+        <p:spPr>
+          <a:xfrm>
+            <a:off x="469617" y="2828558"/>
+            <a:ext cx="853706" cy="500485"/>
+          </a:xfrm>
+          <a:prstGeom prst="rect">
+            <a:avLst/>
+          </a:prstGeom>
+        </p:spPr>
+      </p:pic>
+      <p:cxnSp>
+        <p:nvCxnSpPr>
+          <p:cNvPr id="45" name="Gerader Verbinder 44"/>
+          <p:cNvCxnSpPr/>
+          <p:nvPr/>
+        </p:nvCxnSpPr>
+        <p:spPr>
+          <a:xfrm flipH="1">
+            <a:off x="803239" y="772924"/>
+            <a:ext cx="3909101" cy="2073255"/>
+          </a:xfrm>
+          <a:prstGeom prst="line">
+            <a:avLst/>
+          </a:prstGeom>
+          <a:ln w="38100">
+            <a:solidFill>
+              <a:schemeClr val="bg1">
+                <a:lumMod val="65000"/>
+              </a:schemeClr>
+            </a:solidFill>
+          </a:ln>
+        </p:spPr>
+        <p:style>
+          <a:lnRef idx="1">
+            <a:schemeClr val="accent1"/>
+          </a:lnRef>
+          <a:fillRef idx="0">
+            <a:schemeClr val="accent1"/>
+          </a:fillRef>
+          <a:effectRef idx="0">
+            <a:schemeClr val="accent1"/>
+          </a:effectRef>
+          <a:fontRef idx="minor">
+            <a:schemeClr val="tx1"/>
+          </a:fontRef>
+        </p:style>
+      </p:cxnSp>
+      <p:sp>
+        <p:nvSpPr>
+          <p:cNvPr id="2" name="Titel 1"/>
+          <p:cNvSpPr>
+            <a:spLocks noGrp="1"/>
+          </p:cNvSpPr>
+          <p:nvPr>
+            <p:ph type="ctrTitle"/>
+          </p:nvPr>
+        </p:nvSpPr>
+        <p:spPr>
+          <a:xfrm>
+            <a:off x="1242575" y="1373764"/>
+            <a:ext cx="2936760" cy="777546"/>
+          </a:xfrm>
+          <a:prstGeom prst="roundRect">
+            <a:avLst/>
+          </a:prstGeom>
+          <a:ln w="38100">
+            <a:solidFill>
+              <a:schemeClr val="bg1">
+                <a:lumMod val="65000"/>
+              </a:schemeClr>
+            </a:solidFill>
+          </a:ln>
+        </p:spPr>
+        <p:style>
+          <a:lnRef idx="2">
+            <a:schemeClr val="dk1"/>
+          </a:lnRef>
+          <a:fillRef idx="1">
+            <a:schemeClr val="lt1"/>
+          </a:fillRef>
+          <a:effectRef idx="0">
+            <a:schemeClr val="dk1"/>
+          </a:effectRef>
+          <a:fontRef idx="minor">
+            <a:schemeClr val="dk1"/>
+          </a:fontRef>
+        </p:style>
+        <p:txBody>
+          <a:bodyPr wrap="none" lIns="0" tIns="108000" rIns="0" bIns="0" anchor="ctr">
+            <a:noAutofit/>
+          </a:bodyPr>
+          <a:lstStyle/>
+          <a:p>
+            <a:r>
+              <a:rPr lang="de-DE" sz="6000" dirty="0" err="1" smtClean="0">
+                <a:solidFill>
+                  <a:schemeClr val="tx1">
+                    <a:lumMod val="85000"/>
+                    <a:lumOff val="15000"/>
+                  </a:schemeClr>
+                </a:solidFill>
+                <a:latin typeface="Impact" panose="020B0806030902050204" pitchFamily="34" charset="0"/>
+              </a:rPr>
+              <a:t>IoT</a:t>
+            </a:r>
+            <a:r>
+              <a:rPr lang="de-DE" sz="6000" dirty="0" smtClean="0">
+                <a:solidFill>
+                  <a:schemeClr val="tx1">
+                    <a:lumMod val="85000"/>
+                    <a:lumOff val="15000"/>
+                  </a:schemeClr>
+                </a:solidFill>
+                <a:latin typeface="Impact" panose="020B0806030902050204" pitchFamily="34" charset="0"/>
+              </a:rPr>
+              <a:t>-ASAP</a:t>
+            </a:r>
+            <a:endParaRPr lang="en-US" sz="6000" dirty="0">
+              <a:solidFill>
+                <a:schemeClr val="tx1">
+                  <a:lumMod val="85000"/>
+                  <a:lumOff val="15000"/>
+                </a:schemeClr>
+              </a:solidFill>
+              <a:latin typeface="Impact" panose="020B0806030902050204" pitchFamily="34" charset="0"/>
+            </a:endParaRPr>
+          </a:p>
+        </p:txBody>
+      </p:sp>
+      <p:sp>
+        <p:nvSpPr>
+          <p:cNvPr id="27" name="Titel 1"/>
+          <p:cNvSpPr txBox="1">
+            <a:spLocks/>
+          </p:cNvSpPr>
+          <p:nvPr/>
+        </p:nvSpPr>
+        <p:spPr>
+          <a:xfrm>
+            <a:off x="1930783" y="2157769"/>
+            <a:ext cx="1539109" cy="777546"/>
+          </a:xfrm>
+          <a:prstGeom prst="roundRect">
+            <a:avLst/>
+          </a:prstGeom>
+          <a:ln w="38100" cap="flat" cmpd="sng" algn="ctr">
+            <a:solidFill>
+              <a:schemeClr val="bg1">
+                <a:lumMod val="65000"/>
+              </a:schemeClr>
+            </a:solidFill>
+            <a:prstDash val="solid"/>
+            <a:miter lim="800000"/>
+          </a:ln>
+        </p:spPr>
+        <p:style>
+          <a:lnRef idx="2">
+            <a:schemeClr val="dk1"/>
+          </a:lnRef>
+          <a:fillRef idx="1">
+            <a:schemeClr val="lt1"/>
+          </a:fillRef>
+          <a:effectRef idx="0">
+            <a:schemeClr val="dk1"/>
+          </a:effectRef>
+          <a:fontRef idx="minor">
+            <a:schemeClr val="dk1"/>
+          </a:fontRef>
+        </p:style>
+        <p:txBody>
+          <a:bodyPr vert="horz" wrap="none" lIns="0" tIns="108000" rIns="0" bIns="0" rtlCol="0" anchor="ctr">
+            <a:noAutofit/>
+          </a:bodyPr>
+          <a:lstStyle>
+            <a:lvl1pPr algn="ctr" defTabSz="480060" rtl="0" eaLnBrk="1" latinLnBrk="0" hangingPunct="1">
+              <a:lnSpc>
+                <a:spcPct val="90000"/>
+              </a:lnSpc>
+              <a:spcBef>
+                <a:spcPct val="0"/>
+              </a:spcBef>
+              <a:buNone/>
+              <a:defRPr sz="3150" kern="1200">
+                <a:solidFill>
+                  <a:schemeClr val="dk1"/>
+                </a:solidFill>
+                <a:latin typeface="+mn-lt"/>
+                <a:ea typeface="+mn-ea"/>
+                <a:cs typeface="+mn-cs"/>
+              </a:defRPr>
+            </a:lvl1pPr>
+            <a:lvl2pPr>
+              <a:defRPr>
+                <a:solidFill>
+                  <a:schemeClr val="dk1"/>
+                </a:solidFill>
+                <a:latin typeface="+mn-lt"/>
+                <a:ea typeface="+mn-ea"/>
+                <a:cs typeface="+mn-cs"/>
+              </a:defRPr>
+            </a:lvl2pPr>
+            <a:lvl3pPr>
+              <a:defRPr>
+                <a:solidFill>
+                  <a:schemeClr val="dk1"/>
+                </a:solidFill>
+                <a:latin typeface="+mn-lt"/>
+                <a:ea typeface="+mn-ea"/>
+                <a:cs typeface="+mn-cs"/>
+              </a:defRPr>
+            </a:lvl3pPr>
+            <a:lvl4pPr>
+              <a:defRPr>
+                <a:solidFill>
+                  <a:schemeClr val="dk1"/>
+                </a:solidFill>
+                <a:latin typeface="+mn-lt"/>
+                <a:ea typeface="+mn-ea"/>
+                <a:cs typeface="+mn-cs"/>
+              </a:defRPr>
+            </a:lvl4pPr>
+            <a:lvl5pPr>
+              <a:defRPr>
+                <a:solidFill>
+                  <a:schemeClr val="dk1"/>
+                </a:solidFill>
+                <a:latin typeface="+mn-lt"/>
+                <a:ea typeface="+mn-ea"/>
+                <a:cs typeface="+mn-cs"/>
+              </a:defRPr>
+            </a:lvl5pPr>
+            <a:lvl6pPr>
+              <a:defRPr>
+                <a:solidFill>
+                  <a:schemeClr val="dk1"/>
+                </a:solidFill>
+                <a:latin typeface="+mn-lt"/>
+                <a:ea typeface="+mn-ea"/>
+                <a:cs typeface="+mn-cs"/>
+              </a:defRPr>
+            </a:lvl6pPr>
+            <a:lvl7pPr>
+              <a:defRPr>
+                <a:solidFill>
+                  <a:schemeClr val="dk1"/>
+                </a:solidFill>
+                <a:latin typeface="+mn-lt"/>
+                <a:ea typeface="+mn-ea"/>
+                <a:cs typeface="+mn-cs"/>
+              </a:defRPr>
+            </a:lvl7pPr>
+            <a:lvl8pPr>
+              <a:defRPr>
+                <a:solidFill>
+                  <a:schemeClr val="dk1"/>
+                </a:solidFill>
+                <a:latin typeface="+mn-lt"/>
+                <a:ea typeface="+mn-ea"/>
+                <a:cs typeface="+mn-cs"/>
+              </a:defRPr>
+            </a:lvl8pPr>
+            <a:lvl9pPr>
+              <a:defRPr>
+                <a:solidFill>
+                  <a:schemeClr val="dk1"/>
+                </a:solidFill>
+                <a:latin typeface="+mn-lt"/>
+                <a:ea typeface="+mn-ea"/>
+                <a:cs typeface="+mn-cs"/>
+              </a:defRPr>
+            </a:lvl9pPr>
+          </a:lstStyle>
+          <a:p>
+            <a:r>
               <a:rPr lang="de-DE" sz="6000" smtClean="0">
                 <a:solidFill>
                   <a:schemeClr val="tx1">
@@ -7728,7 +8958,7 @@
 </p:sld>
 </file>
 
-<file path=ppt/slides/slide5.xml><?xml version="1.0" encoding="utf-8"?>
+<file path=ppt/slides/slide6.xml><?xml version="1.0" encoding="utf-8"?>
 <p:sld xmlns:a="http://schemas.openxmlformats.org/drawingml/2006/main" xmlns:r="http://schemas.openxmlformats.org/officeDocument/2006/relationships" xmlns:p="http://schemas.openxmlformats.org/presentationml/2006/main">
   <p:cSld>
     <p:bg>

</xml_diff>